<commit_message>
Ep 11 filmed; several other updates.
</commit_message>
<xml_diff>
--- a/pic-src/show-icons/sigcse-2014-special-project-grant-splash.pptx
+++ b/pic-src/show-icons/sigcse-2014-special-project-grant-splash.pptx
@@ -3317,8 +3317,8 @@
         </p:nvSpPr>
         <p:spPr>
           <a:xfrm>
-            <a:off x="6088382" y="3483829"/>
-            <a:ext cx="1944378" cy="646331"/>
+            <a:off x="6088382" y="3140968"/>
+            <a:ext cx="1944378" cy="1200329"/>
           </a:xfrm>
           <a:prstGeom prst="rect">
             <a:avLst/>
@@ -3333,6 +3333,13 @@
           <a:p>
             <a:r>
               <a:rPr lang="en-CA" sz="3600" b="1" dirty="0" smtClean="0"/>
+              <a:t>Steve</a:t>
+            </a:r>
+            <a:br>
+              <a:rPr lang="en-CA" sz="3600" b="1" dirty="0" smtClean="0"/>
+            </a:br>
+            <a:r>
+              <a:rPr lang="en-CA" sz="3600" b="1" dirty="0" err="1" smtClean="0"/>
               <a:t>Wolfman</a:t>
             </a:r>
             <a:endParaRPr lang="en-CA" sz="3600" b="1" dirty="0"/>
@@ -3347,8 +3354,8 @@
         </p:nvSpPr>
         <p:spPr>
           <a:xfrm>
-            <a:off x="7901889" y="2331701"/>
-            <a:ext cx="1062599" cy="646331"/>
+            <a:off x="7901889" y="1916832"/>
+            <a:ext cx="1062599" cy="1200329"/>
           </a:xfrm>
           <a:prstGeom prst="rect">
             <a:avLst/>
@@ -3361,6 +3368,13 @@
           </a:bodyPr>
           <a:lstStyle/>
           <a:p>
+            <a:r>
+              <a:rPr lang="en-CA" sz="3600" b="1" dirty="0" smtClean="0"/>
+              <a:t>Will</a:t>
+            </a:r>
+            <a:br>
+              <a:rPr lang="en-CA" sz="3600" b="1" dirty="0" smtClean="0"/>
+            </a:br>
             <a:r>
               <a:rPr lang="en-CA" sz="3600" b="1" dirty="0" smtClean="0"/>
               <a:t>Byrd</a:t>

</xml_diff>